<commit_message>
Added solutions for Blockly - Turtle.
</commit_message>
<xml_diff>
--- a/files/Gry Blockly/Blockly Żółw.pptx
+++ b/files/Gry Blockly/Blockly Żółw.pptx
@@ -232,7 +232,7 @@
             <a:fld id="{FE99C238-BBD4-47FA-ADDF-FFB895C0A193}" type="datetimeFigureOut">
               <a:rPr lang="pl-PL" smtClean="0"/>
               <a:pPr/>
-              <a:t>10.05.2018</a:t>
+              <a:t>02.07.2020</a:t>
             </a:fld>
             <a:endParaRPr lang="pl-PL"/>
           </a:p>
@@ -677,7 +677,7 @@
             <a:fld id="{66221E02-25CB-4963-84BC-0813985E7D90}" type="datetimeFigureOut">
               <a:rPr lang="pl-PL" smtClean="0"/>
               <a:pPr/>
-              <a:t>10.05.2018</a:t>
+              <a:t>02.07.2020</a:t>
             </a:fld>
             <a:endParaRPr lang="pl-PL"/>
           </a:p>
@@ -842,7 +842,7 @@
             <a:fld id="{66221E02-25CB-4963-84BC-0813985E7D90}" type="datetimeFigureOut">
               <a:rPr lang="pl-PL" smtClean="0"/>
               <a:pPr/>
-              <a:t>10.05.2018</a:t>
+              <a:t>02.07.2020</a:t>
             </a:fld>
             <a:endParaRPr lang="pl-PL"/>
           </a:p>
@@ -1017,7 +1017,7 @@
             <a:fld id="{66221E02-25CB-4963-84BC-0813985E7D90}" type="datetimeFigureOut">
               <a:rPr lang="pl-PL" smtClean="0"/>
               <a:pPr/>
-              <a:t>10.05.2018</a:t>
+              <a:t>02.07.2020</a:t>
             </a:fld>
             <a:endParaRPr lang="pl-PL"/>
           </a:p>
@@ -1182,7 +1182,7 @@
             <a:fld id="{66221E02-25CB-4963-84BC-0813985E7D90}" type="datetimeFigureOut">
               <a:rPr lang="pl-PL" smtClean="0"/>
               <a:pPr/>
-              <a:t>10.05.2018</a:t>
+              <a:t>02.07.2020</a:t>
             </a:fld>
             <a:endParaRPr lang="pl-PL"/>
           </a:p>
@@ -1424,7 +1424,7 @@
             <a:fld id="{66221E02-25CB-4963-84BC-0813985E7D90}" type="datetimeFigureOut">
               <a:rPr lang="pl-PL" smtClean="0"/>
               <a:pPr/>
-              <a:t>10.05.2018</a:t>
+              <a:t>02.07.2020</a:t>
             </a:fld>
             <a:endParaRPr lang="pl-PL"/>
           </a:p>
@@ -1706,7 +1706,7 @@
             <a:fld id="{66221E02-25CB-4963-84BC-0813985E7D90}" type="datetimeFigureOut">
               <a:rPr lang="pl-PL" smtClean="0"/>
               <a:pPr/>
-              <a:t>10.05.2018</a:t>
+              <a:t>02.07.2020</a:t>
             </a:fld>
             <a:endParaRPr lang="pl-PL"/>
           </a:p>
@@ -2122,7 +2122,7 @@
             <a:fld id="{66221E02-25CB-4963-84BC-0813985E7D90}" type="datetimeFigureOut">
               <a:rPr lang="pl-PL" smtClean="0"/>
               <a:pPr/>
-              <a:t>10.05.2018</a:t>
+              <a:t>02.07.2020</a:t>
             </a:fld>
             <a:endParaRPr lang="pl-PL"/>
           </a:p>
@@ -2236,7 +2236,7 @@
             <a:fld id="{66221E02-25CB-4963-84BC-0813985E7D90}" type="datetimeFigureOut">
               <a:rPr lang="pl-PL" smtClean="0"/>
               <a:pPr/>
-              <a:t>10.05.2018</a:t>
+              <a:t>02.07.2020</a:t>
             </a:fld>
             <a:endParaRPr lang="pl-PL"/>
           </a:p>
@@ -2328,7 +2328,7 @@
             <a:fld id="{66221E02-25CB-4963-84BC-0813985E7D90}" type="datetimeFigureOut">
               <a:rPr lang="pl-PL" smtClean="0"/>
               <a:pPr/>
-              <a:t>10.05.2018</a:t>
+              <a:t>02.07.2020</a:t>
             </a:fld>
             <a:endParaRPr lang="pl-PL"/>
           </a:p>
@@ -2600,7 +2600,7 @@
             <a:fld id="{66221E02-25CB-4963-84BC-0813985E7D90}" type="datetimeFigureOut">
               <a:rPr lang="pl-PL" smtClean="0"/>
               <a:pPr/>
-              <a:t>10.05.2018</a:t>
+              <a:t>02.07.2020</a:t>
             </a:fld>
             <a:endParaRPr lang="pl-PL"/>
           </a:p>
@@ -2849,7 +2849,7 @@
             <a:fld id="{66221E02-25CB-4963-84BC-0813985E7D90}" type="datetimeFigureOut">
               <a:rPr lang="pl-PL" smtClean="0"/>
               <a:pPr/>
-              <a:t>10.05.2018</a:t>
+              <a:t>02.07.2020</a:t>
             </a:fld>
             <a:endParaRPr lang="pl-PL"/>
           </a:p>
@@ -3057,7 +3057,7 @@
             <a:fld id="{66221E02-25CB-4963-84BC-0813985E7D90}" type="datetimeFigureOut">
               <a:rPr lang="pl-PL" smtClean="0"/>
               <a:pPr/>
-              <a:t>10.05.2018</a:t>
+              <a:t>02.07.2020</a:t>
             </a:fld>
             <a:endParaRPr lang="pl-PL"/>
           </a:p>
@@ -4962,7 +4962,7 @@
         </p:blipFill>
         <p:spPr>
           <a:xfrm>
-            <a:off x="5289071" y="320843"/>
+            <a:off x="5289071" y="292562"/>
             <a:ext cx="3014157" cy="3930315"/>
           </a:xfrm>
           <a:prstGeom prst="rect">
@@ -5731,7 +5731,7 @@
         </p:blipFill>
         <p:spPr>
           <a:xfrm>
-            <a:off x="5277410" y="320843"/>
+            <a:off x="5277410" y="292562"/>
             <a:ext cx="3037479" cy="3930315"/>
           </a:xfrm>
           <a:prstGeom prst="rect">
@@ -6826,7 +6826,7 @@
         </p:blipFill>
         <p:spPr>
           <a:xfrm>
-            <a:off x="5695128" y="320843"/>
+            <a:off x="5695128" y="292563"/>
             <a:ext cx="2202042" cy="3930315"/>
           </a:xfrm>
           <a:prstGeom prst="rect">
@@ -7304,7 +7304,7 @@
           <a:p>
             <a:r>
               <a:rPr lang="pl-PL" dirty="0"/>
-              <a:t>Przed narysowaniem czarnego, musimy żółwia odpowiednio przemieścić</a:t>
+              <a:t>Przed narysowaniem czarnego koła, musimy żółwia odpowiednio przemieścić</a:t>
             </a:r>
           </a:p>
           <a:p>

</xml_diff>